<commit_message>
added a slide on my presentation slides
</commit_message>
<xml_diff>
--- a/Presentation/KonstantinaSlides.pptx
+++ b/Presentation/KonstantinaSlides.pptx
@@ -5,11 +5,12 @@
     <p:sldMasterId id="2147483648" r:id="rId1"/>
   </p:sldMasterIdLst>
   <p:notesMasterIdLst>
-    <p:notesMasterId r:id="rId4"/>
+    <p:notesMasterId r:id="rId5"/>
   </p:notesMasterIdLst>
   <p:sldIdLst>
     <p:sldId id="258" r:id="rId2"/>
-    <p:sldId id="259" r:id="rId3"/>
+    <p:sldId id="260" r:id="rId3"/>
+    <p:sldId id="259" r:id="rId4"/>
   </p:sldIdLst>
   <p:sldSz cx="9144000" cy="6858000" type="screen4x3"/>
   <p:notesSz cx="6858000" cy="9144000"/>
@@ -108,6 +109,11 @@
       </a:defRPr>
     </a:lvl9pPr>
   </p:defaultTextStyle>
+  <p:extLst>
+    <p:ext uri="{EFAFB233-063F-42B5-8137-9DF3F51BA10A}">
+      <p15:sldGuideLst xmlns:p15="http://schemas.microsoft.com/office/powerpoint/2012/main"/>
+    </p:ext>
+  </p:extLst>
 </p:presentation>
 </file>
 
@@ -3233,60 +3239,6 @@
       </p:grpSpPr>
       <p:sp>
         <p:nvSpPr>
-          <p:cNvPr id="2" name="Τίτλος 1">
-            <a:extLst>
-              <a:ext uri="{FF2B5EF4-FFF2-40B4-BE49-F238E27FC236}">
-                <a16:creationId xmlns:a16="http://schemas.microsoft.com/office/drawing/2014/main" id="{B60BB4A7-BEEE-4B4F-8495-9A4F550C675B}"/>
-              </a:ext>
-            </a:extLst>
-          </p:cNvPr>
-          <p:cNvSpPr>
-            <a:spLocks noGrp="1"/>
-          </p:cNvSpPr>
-          <p:nvPr>
-            <p:ph type="title"/>
-          </p:nvPr>
-        </p:nvSpPr>
-        <p:spPr/>
-        <p:txBody>
-          <a:bodyPr/>
-          <a:lstStyle/>
-          <a:p>
-            <a:pPr algn="ctr"/>
-            <a:r>
-              <a:rPr lang="en-US" sz="3300" spc="-1" dirty="0">
-                <a:solidFill>
-                  <a:srgbClr val="7B9899"/>
-                </a:solidFill>
-                <a:uFill>
-                  <a:solidFill>
-                    <a:srgbClr val="FFFFFF"/>
-                  </a:solidFill>
-                </a:uFill>
-                <a:latin typeface="Georgia"/>
-                <a:ea typeface="+mn-ea"/>
-                <a:cs typeface="+mn-cs"/>
-              </a:rPr>
-              <a:t>Team and teamwork</a:t>
-            </a:r>
-            <a:endParaRPr lang="el-GR" sz="3300" spc="-1" dirty="0">
-              <a:solidFill>
-                <a:srgbClr val="7B9899"/>
-              </a:solidFill>
-              <a:uFill>
-                <a:solidFill>
-                  <a:srgbClr val="FFFFFF"/>
-                </a:solidFill>
-              </a:uFill>
-              <a:latin typeface="Georgia"/>
-              <a:ea typeface="+mn-ea"/>
-              <a:cs typeface="+mn-cs"/>
-            </a:endParaRPr>
-          </a:p>
-        </p:txBody>
-      </p:sp>
-      <p:sp>
-        <p:nvSpPr>
           <p:cNvPr id="3" name="Υπότιτλος 2">
             <a:extLst>
               <a:ext uri="{FF2B5EF4-FFF2-40B4-BE49-F238E27FC236}">
@@ -3298,7 +3250,7 @@
             <a:spLocks noGrp="1"/>
           </p:cNvSpPr>
           <p:nvPr>
-            <p:ph type="subTitle"/>
+            <p:ph type="body"/>
           </p:nvPr>
         </p:nvSpPr>
         <p:spPr/>
@@ -3762,6 +3714,60 @@
               <a:buNone/>
             </a:pPr>
             <a:endParaRPr lang="el-GR" dirty="0"/>
+          </a:p>
+        </p:txBody>
+      </p:sp>
+      <p:sp>
+        <p:nvSpPr>
+          <p:cNvPr id="2" name="Τίτλος 1">
+            <a:extLst>
+              <a:ext uri="{FF2B5EF4-FFF2-40B4-BE49-F238E27FC236}">
+                <a16:creationId xmlns:a16="http://schemas.microsoft.com/office/drawing/2014/main" id="{B60BB4A7-BEEE-4B4F-8495-9A4F550C675B}"/>
+              </a:ext>
+            </a:extLst>
+          </p:cNvPr>
+          <p:cNvSpPr>
+            <a:spLocks noGrp="1"/>
+          </p:cNvSpPr>
+          <p:nvPr>
+            <p:ph type="title"/>
+          </p:nvPr>
+        </p:nvSpPr>
+        <p:spPr/>
+        <p:txBody>
+          <a:bodyPr/>
+          <a:lstStyle/>
+          <a:p>
+            <a:pPr algn="ctr"/>
+            <a:r>
+              <a:rPr lang="en-US" sz="3300" spc="-1" dirty="0">
+                <a:solidFill>
+                  <a:srgbClr val="7B9899"/>
+                </a:solidFill>
+                <a:uFill>
+                  <a:solidFill>
+                    <a:srgbClr val="FFFFFF"/>
+                  </a:solidFill>
+                </a:uFill>
+                <a:latin typeface="Georgia"/>
+                <a:ea typeface="+mn-ea"/>
+                <a:cs typeface="+mn-cs"/>
+              </a:rPr>
+              <a:t>Team and teamwork (1/2)</a:t>
+            </a:r>
+            <a:endParaRPr lang="el-GR" sz="3300" spc="-1" dirty="0">
+              <a:solidFill>
+                <a:srgbClr val="7B9899"/>
+              </a:solidFill>
+              <a:uFill>
+                <a:solidFill>
+                  <a:srgbClr val="FFFFFF"/>
+                </a:solidFill>
+              </a:uFill>
+              <a:latin typeface="Georgia"/>
+              <a:ea typeface="+mn-ea"/>
+              <a:cs typeface="+mn-cs"/>
+            </a:endParaRPr>
           </a:p>
         </p:txBody>
       </p:sp>
@@ -3797,10 +3803,10 @@
       </p:grpSpPr>
       <p:sp>
         <p:nvSpPr>
-          <p:cNvPr id="2" name="Τίτλος 1">
+          <p:cNvPr id="5" name="Θέση κειμένου 4">
             <a:extLst>
               <a:ext uri="{FF2B5EF4-FFF2-40B4-BE49-F238E27FC236}">
-                <a16:creationId xmlns:a16="http://schemas.microsoft.com/office/drawing/2014/main" id="{06D2CD93-78AF-4441-AEAA-ED1BE3AA1596}"/>
+                <a16:creationId xmlns:a16="http://schemas.microsoft.com/office/drawing/2014/main" id="{4F81B91E-B8C7-4DD3-A813-1D038BA4C08F}"/>
               </a:ext>
             </a:extLst>
           </p:cNvPr>
@@ -3808,64 +3814,15 @@
             <a:spLocks noGrp="1"/>
           </p:cNvSpPr>
           <p:nvPr>
-            <p:ph type="title"/>
-          </p:nvPr>
-        </p:nvSpPr>
-        <p:spPr/>
-        <p:txBody>
-          <a:bodyPr/>
-          <a:lstStyle/>
-          <a:p>
-            <a:pPr algn="ctr"/>
-            <a:r>
-              <a:rPr lang="en-US" sz="3300" spc="-1" dirty="0">
-                <a:solidFill>
-                  <a:srgbClr val="7B9899"/>
-                </a:solidFill>
-                <a:uFill>
-                  <a:solidFill>
-                    <a:srgbClr val="FFFFFF"/>
-                  </a:solidFill>
-                </a:uFill>
-                <a:latin typeface="Georgia"/>
-                <a:ea typeface="+mn-ea"/>
-                <a:cs typeface="+mn-cs"/>
-              </a:rPr>
-              <a:t>Solution</a:t>
-            </a:r>
-            <a:endParaRPr lang="el-GR" sz="3300" spc="-1" dirty="0">
-              <a:solidFill>
-                <a:srgbClr val="7B9899"/>
-              </a:solidFill>
-              <a:uFill>
-                <a:solidFill>
-                  <a:srgbClr val="FFFFFF"/>
-                </a:solidFill>
-              </a:uFill>
-              <a:latin typeface="Georgia"/>
-              <a:ea typeface="+mn-ea"/>
-              <a:cs typeface="+mn-cs"/>
-            </a:endParaRPr>
-          </a:p>
-        </p:txBody>
-      </p:sp>
-      <p:sp>
-        <p:nvSpPr>
-          <p:cNvPr id="3" name="Υπότιτλος 2">
-            <a:extLst>
-              <a:ext uri="{FF2B5EF4-FFF2-40B4-BE49-F238E27FC236}">
-                <a16:creationId xmlns:a16="http://schemas.microsoft.com/office/drawing/2014/main" id="{3859C7E3-0D59-4996-8E44-147BD0781097}"/>
-              </a:ext>
-            </a:extLst>
-          </p:cNvPr>
-          <p:cNvSpPr>
-            <a:spLocks noGrp="1"/>
-          </p:cNvSpPr>
-          <p:nvPr>
-            <p:ph type="subTitle"/>
-          </p:nvPr>
-        </p:nvSpPr>
-        <p:spPr/>
+            <p:ph type="body"/>
+          </p:nvPr>
+        </p:nvSpPr>
+        <p:spPr>
+          <a:xfrm>
+            <a:off x="301680" y="1527120"/>
+            <a:ext cx="8503560" cy="4571640"/>
+          </a:xfrm>
+        </p:spPr>
         <p:txBody>
           <a:bodyPr/>
           <a:lstStyle/>
@@ -3896,34 +3853,7 @@
                 </a:uFill>
                 <a:latin typeface="Georgia"/>
               </a:rPr>
-              <a:t>Proposed solution</a:t>
-            </a:r>
-          </a:p>
-          <a:p>
-            <a:pPr marL="1296000" lvl="2" indent="-288000">
-              <a:spcBef>
-                <a:spcPts val="850"/>
-              </a:spcBef>
-              <a:buClr>
-                <a:srgbClr val="000000"/>
-              </a:buClr>
-              <a:buSzPct val="45000"/>
-              <a:buFont typeface="Wingdings" charset="2"/>
-              <a:buChar char=""/>
-            </a:pPr>
-            <a:r>
-              <a:rPr lang="en-US" sz="1800" spc="-1" dirty="0">
-                <a:solidFill>
-                  <a:srgbClr val="000000"/>
-                </a:solidFill>
-                <a:uFill>
-                  <a:solidFill>
-                    <a:srgbClr val="FFFFFF"/>
-                  </a:solidFill>
-                </a:uFill>
-                <a:latin typeface="Georgia"/>
-              </a:rPr>
-              <a:t>Developing a social app/web to share resources and help pets and owners</a:t>
+              <a:t>We are a group of 6 people from different countries -&gt; different cultures -&gt; problems</a:t>
             </a:r>
           </a:p>
           <a:p>
@@ -3953,7 +3883,204 @@
                 </a:uFill>
                 <a:latin typeface="Georgia"/>
               </a:rPr>
-              <a:t>Collaborative aspects of the chosen approach</a:t>
+              <a:t>We did the best effort that we could to solve the problems in our coordination and work together like a team until the end.</a:t>
+            </a:r>
+          </a:p>
+          <a:p>
+            <a:pPr marL="274320" lvl="2" indent="-273960">
+              <a:lnSpc>
+                <a:spcPct val="100000"/>
+              </a:lnSpc>
+              <a:spcBef>
+                <a:spcPts val="541"/>
+              </a:spcBef>
+              <a:buClr>
+                <a:srgbClr val="D16349"/>
+              </a:buClr>
+              <a:buSzPct val="85000"/>
+              <a:buFont typeface="Wingdings 2" charset="2"/>
+              <a:buChar char=""/>
+            </a:pPr>
+            <a:r>
+              <a:rPr lang="en-US" sz="2700" spc="-1" dirty="0">
+                <a:solidFill>
+                  <a:srgbClr val="000000"/>
+                </a:solidFill>
+                <a:uFill>
+                  <a:solidFill>
+                    <a:srgbClr val="FFFFFF"/>
+                  </a:solidFill>
+                </a:uFill>
+                <a:latin typeface="Georgia"/>
+              </a:rPr>
+              <a:t>Some people tried more than other                         people but finally we have the project                             done. </a:t>
+            </a:r>
+          </a:p>
+        </p:txBody>
+      </p:sp>
+      <p:sp>
+        <p:nvSpPr>
+          <p:cNvPr id="4" name="Τίτλος 3">
+            <a:extLst>
+              <a:ext uri="{FF2B5EF4-FFF2-40B4-BE49-F238E27FC236}">
+                <a16:creationId xmlns:a16="http://schemas.microsoft.com/office/drawing/2014/main" id="{F06CC004-3DCF-4E22-B4E9-FC6F6BFD9906}"/>
+              </a:ext>
+            </a:extLst>
+          </p:cNvPr>
+          <p:cNvSpPr>
+            <a:spLocks noGrp="1"/>
+          </p:cNvSpPr>
+          <p:nvPr>
+            <p:ph type="title"/>
+          </p:nvPr>
+        </p:nvSpPr>
+        <p:spPr>
+          <a:xfrm>
+            <a:off x="301680" y="228600"/>
+            <a:ext cx="8534160" cy="758520"/>
+          </a:xfrm>
+        </p:spPr>
+        <p:txBody>
+          <a:bodyPr/>
+          <a:lstStyle/>
+          <a:p>
+            <a:pPr algn="ctr"/>
+            <a:r>
+              <a:rPr lang="en-US"/>
+              <a:t> </a:t>
+            </a:r>
+            <a:r>
+              <a:rPr lang="en-US" sz="3300" spc="-1">
+                <a:solidFill>
+                  <a:srgbClr val="7B9899"/>
+                </a:solidFill>
+                <a:uFill>
+                  <a:solidFill>
+                    <a:srgbClr val="FFFFFF"/>
+                  </a:solidFill>
+                </a:uFill>
+                <a:latin typeface="Georgia"/>
+              </a:rPr>
+              <a:t>Team and teamwork (2/2)</a:t>
+            </a:r>
+            <a:endParaRPr lang="el-GR" sz="3300" dirty="0"/>
+          </a:p>
+        </p:txBody>
+      </p:sp>
+      <p:pic>
+        <p:nvPicPr>
+          <p:cNvPr id="10" name="Εικόνα 9">
+            <a:extLst>
+              <a:ext uri="{FF2B5EF4-FFF2-40B4-BE49-F238E27FC236}">
+                <a16:creationId xmlns:a16="http://schemas.microsoft.com/office/drawing/2014/main" id="{B7B3C0DC-5E28-4D51-B7C7-25CBDFF5626B}"/>
+              </a:ext>
+            </a:extLst>
+          </p:cNvPr>
+          <p:cNvPicPr>
+            <a:picLocks noChangeAspect="1"/>
+          </p:cNvPicPr>
+          <p:nvPr/>
+        </p:nvPicPr>
+        <p:blipFill>
+          <a:blip r:embed="rId2">
+            <a:extLst>
+              <a:ext uri="{28A0092B-C50C-407E-A947-70E740481C1C}">
+                <a14:useLocalDpi xmlns:a14="http://schemas.microsoft.com/office/drawing/2010/main" val="0"/>
+              </a:ext>
+            </a:extLst>
+          </a:blip>
+          <a:stretch>
+            <a:fillRect/>
+          </a:stretch>
+        </p:blipFill>
+        <p:spPr>
+          <a:xfrm>
+            <a:off x="6274192" y="3813769"/>
+            <a:ext cx="2568128" cy="2568128"/>
+          </a:xfrm>
+          <a:prstGeom prst="rect">
+            <a:avLst/>
+          </a:prstGeom>
+        </p:spPr>
+      </p:pic>
+    </p:spTree>
+    <p:extLst>
+      <p:ext uri="{BB962C8B-B14F-4D97-AF65-F5344CB8AC3E}">
+        <p14:creationId xmlns:p14="http://schemas.microsoft.com/office/powerpoint/2010/main" val="1193973413"/>
+      </p:ext>
+    </p:extLst>
+  </p:cSld>
+  <p:clrMapOvr>
+    <a:masterClrMapping/>
+  </p:clrMapOvr>
+</p:sld>
+</file>
+
+<file path=ppt/slides/slide3.xml><?xml version="1.0" encoding="utf-8"?>
+<p:sld xmlns:a="http://schemas.openxmlformats.org/drawingml/2006/main" xmlns:r="http://schemas.openxmlformats.org/officeDocument/2006/relationships" xmlns:p="http://schemas.openxmlformats.org/presentationml/2006/main">
+  <p:cSld>
+    <p:spTree>
+      <p:nvGrpSpPr>
+        <p:cNvPr id="1" name=""/>
+        <p:cNvGrpSpPr/>
+        <p:nvPr/>
+      </p:nvGrpSpPr>
+      <p:grpSpPr>
+        <a:xfrm>
+          <a:off x="0" y="0"/>
+          <a:ext cx="0" cy="0"/>
+          <a:chOff x="0" y="0"/>
+          <a:chExt cx="0" cy="0"/>
+        </a:xfrm>
+      </p:grpSpPr>
+      <p:sp>
+        <p:nvSpPr>
+          <p:cNvPr id="3" name="Υπότιτλος 2">
+            <a:extLst>
+              <a:ext uri="{FF2B5EF4-FFF2-40B4-BE49-F238E27FC236}">
+                <a16:creationId xmlns:a16="http://schemas.microsoft.com/office/drawing/2014/main" id="{3859C7E3-0D59-4996-8E44-147BD0781097}"/>
+              </a:ext>
+            </a:extLst>
+          </p:cNvPr>
+          <p:cNvSpPr>
+            <a:spLocks noGrp="1"/>
+          </p:cNvSpPr>
+          <p:nvPr>
+            <p:ph type="body"/>
+          </p:nvPr>
+        </p:nvSpPr>
+        <p:spPr/>
+        <p:txBody>
+          <a:bodyPr/>
+          <a:lstStyle/>
+          <a:p>
+            <a:pPr marL="274320" lvl="2" indent="-273960">
+              <a:lnSpc>
+                <a:spcPct val="100000"/>
+              </a:lnSpc>
+              <a:spcBef>
+                <a:spcPts val="541"/>
+              </a:spcBef>
+              <a:buClr>
+                <a:srgbClr val="D16349"/>
+              </a:buClr>
+              <a:buSzPct val="85000"/>
+              <a:buFont typeface="Wingdings 2" charset="2"/>
+              <a:buChar char=""/>
+            </a:pPr>
+            <a:r>
+              <a:rPr lang="en-US" sz="2700" spc="-1" dirty="0">
+                <a:solidFill>
+                  <a:srgbClr val="000000"/>
+                </a:solidFill>
+                <a:uFill>
+                  <a:solidFill>
+                    <a:srgbClr val="FFFFFF"/>
+                  </a:solidFill>
+                </a:uFill>
+                <a:latin typeface="Georgia"/>
+              </a:rPr>
+              <a:t>Proposed solution</a:t>
             </a:r>
           </a:p>
           <a:p>
@@ -3980,6 +4107,63 @@
                 </a:uFill>
                 <a:latin typeface="Georgia"/>
               </a:rPr>
+              <a:t>Developing a social app/web to share resources and help pets and owners</a:t>
+            </a:r>
+          </a:p>
+          <a:p>
+            <a:pPr marL="274320" lvl="2" indent="-273960">
+              <a:lnSpc>
+                <a:spcPct val="100000"/>
+              </a:lnSpc>
+              <a:spcBef>
+                <a:spcPts val="541"/>
+              </a:spcBef>
+              <a:buClr>
+                <a:srgbClr val="D16349"/>
+              </a:buClr>
+              <a:buSzPct val="85000"/>
+              <a:buFont typeface="Wingdings 2" charset="2"/>
+              <a:buChar char=""/>
+            </a:pPr>
+            <a:r>
+              <a:rPr lang="en-US" sz="2700" spc="-1" dirty="0">
+                <a:solidFill>
+                  <a:srgbClr val="000000"/>
+                </a:solidFill>
+                <a:uFill>
+                  <a:solidFill>
+                    <a:srgbClr val="FFFFFF"/>
+                  </a:solidFill>
+                </a:uFill>
+                <a:latin typeface="Georgia"/>
+              </a:rPr>
+              <a:t>Collaborative aspects of the chosen approach</a:t>
+            </a:r>
+          </a:p>
+          <a:p>
+            <a:pPr marL="1296000" lvl="2" indent="-288000">
+              <a:spcBef>
+                <a:spcPts val="850"/>
+              </a:spcBef>
+              <a:buClr>
+                <a:srgbClr val="000000"/>
+              </a:buClr>
+              <a:buSzPct val="45000"/>
+              <a:buFont typeface="Wingdings" charset="2"/>
+              <a:buChar char=""/>
+            </a:pPr>
+            <a:r>
+              <a:rPr lang="en-US" sz="1800" spc="-1" dirty="0">
+                <a:solidFill>
+                  <a:srgbClr val="000000"/>
+                </a:solidFill>
+                <a:uFill>
+                  <a:solidFill>
+                    <a:srgbClr val="FFFFFF"/>
+                  </a:solidFill>
+                </a:uFill>
+                <a:latin typeface="Georgia"/>
+              </a:rPr>
               <a:t>People can upload an animal's information they have found on a street</a:t>
             </a:r>
           </a:p>
@@ -4091,6 +4275,60 @@
           </a:p>
           <a:p>
             <a:endParaRPr lang="el-GR" dirty="0"/>
+          </a:p>
+        </p:txBody>
+      </p:sp>
+      <p:sp>
+        <p:nvSpPr>
+          <p:cNvPr id="2" name="Τίτλος 1">
+            <a:extLst>
+              <a:ext uri="{FF2B5EF4-FFF2-40B4-BE49-F238E27FC236}">
+                <a16:creationId xmlns:a16="http://schemas.microsoft.com/office/drawing/2014/main" id="{06D2CD93-78AF-4441-AEAA-ED1BE3AA1596}"/>
+              </a:ext>
+            </a:extLst>
+          </p:cNvPr>
+          <p:cNvSpPr>
+            <a:spLocks noGrp="1"/>
+          </p:cNvSpPr>
+          <p:nvPr>
+            <p:ph type="title"/>
+          </p:nvPr>
+        </p:nvSpPr>
+        <p:spPr/>
+        <p:txBody>
+          <a:bodyPr/>
+          <a:lstStyle/>
+          <a:p>
+            <a:pPr algn="ctr"/>
+            <a:r>
+              <a:rPr lang="en-US" sz="3300" spc="-1" dirty="0">
+                <a:solidFill>
+                  <a:srgbClr val="7B9899"/>
+                </a:solidFill>
+                <a:uFill>
+                  <a:solidFill>
+                    <a:srgbClr val="FFFFFF"/>
+                  </a:solidFill>
+                </a:uFill>
+                <a:latin typeface="Georgia"/>
+                <a:ea typeface="+mn-ea"/>
+                <a:cs typeface="+mn-cs"/>
+              </a:rPr>
+              <a:t>Solution</a:t>
+            </a:r>
+            <a:endParaRPr lang="el-GR" sz="3300" spc="-1" dirty="0">
+              <a:solidFill>
+                <a:srgbClr val="7B9899"/>
+              </a:solidFill>
+              <a:uFill>
+                <a:solidFill>
+                  <a:srgbClr val="FFFFFF"/>
+                </a:solidFill>
+              </a:uFill>
+              <a:latin typeface="Georgia"/>
+              <a:ea typeface="+mn-ea"/>
+              <a:cs typeface="+mn-cs"/>
+            </a:endParaRPr>
           </a:p>
         </p:txBody>
       </p:sp>

</xml_diff>